<commit_message>
Add slide typo fix
</commit_message>
<xml_diff>
--- a/slides/3403 - 3.1 Exceptions and Faults.pptx
+++ b/slides/3403 - 3.1 Exceptions and Faults.pptx
@@ -233,7 +233,7 @@
           <a:p>
             <a:fld id="{DAB400AA-101D-490E-9D4E-C89A20702DB7}" type="datetimeFigureOut">
               <a:rPr lang="en-CA" smtClean="0"/>
-              <a:t>2026-02-10</a:t>
+              <a:t>2026-02-11</a:t>
             </a:fld>
             <a:endParaRPr lang="en-CA"/>
           </a:p>
@@ -818,7 +818,7 @@
           <a:p>
             <a:fld id="{49B572FD-17C4-4195-9A46-AE8481F14B8C}" type="datetime1">
               <a:rPr lang="en-CA" smtClean="0"/>
-              <a:t>2026-02-10</a:t>
+              <a:t>2026-02-11</a:t>
             </a:fld>
             <a:endParaRPr lang="en-CA"/>
           </a:p>
@@ -1022,7 +1022,7 @@
           <a:p>
             <a:fld id="{6FF888EE-D2E8-458C-B025-86AB65CB2342}" type="datetime1">
               <a:rPr lang="en-CA" smtClean="0"/>
-              <a:t>2026-02-10</a:t>
+              <a:t>2026-02-11</a:t>
             </a:fld>
             <a:endParaRPr lang="en-CA"/>
           </a:p>
@@ -1236,7 +1236,7 @@
           <a:p>
             <a:fld id="{54ED418E-0BAA-477E-AE93-7DEEFAFBE002}" type="datetime1">
               <a:rPr lang="en-CA" smtClean="0"/>
-              <a:t>2026-02-10</a:t>
+              <a:t>2026-02-11</a:t>
             </a:fld>
             <a:endParaRPr lang="en-CA"/>
           </a:p>
@@ -1440,7 +1440,7 @@
           <a:p>
             <a:fld id="{CDC1A3F7-612D-48D0-A380-86227BC8600F}" type="datetime1">
               <a:rPr lang="en-CA" smtClean="0"/>
-              <a:t>2026-02-10</a:t>
+              <a:t>2026-02-11</a:t>
             </a:fld>
             <a:endParaRPr lang="en-CA"/>
           </a:p>
@@ -1720,7 +1720,7 @@
           <a:p>
             <a:fld id="{474D8C76-B400-4F53-8805-742D98EC80C2}" type="datetime1">
               <a:rPr lang="en-CA" smtClean="0"/>
-              <a:t>2026-02-10</a:t>
+              <a:t>2026-02-11</a:t>
             </a:fld>
             <a:endParaRPr lang="en-CA"/>
           </a:p>
@@ -1992,7 +1992,7 @@
           <a:p>
             <a:fld id="{6D18C1D2-65BD-4030-B320-CFCAC7C2CF77}" type="datetime1">
               <a:rPr lang="en-CA" smtClean="0"/>
-              <a:t>2026-02-10</a:t>
+              <a:t>2026-02-11</a:t>
             </a:fld>
             <a:endParaRPr lang="en-CA"/>
           </a:p>
@@ -2411,7 +2411,7 @@
           <a:p>
             <a:fld id="{A9216206-5BA6-460D-9780-A5A1F3FC520F}" type="datetime1">
               <a:rPr lang="en-CA" smtClean="0"/>
-              <a:t>2026-02-10</a:t>
+              <a:t>2026-02-11</a:t>
             </a:fld>
             <a:endParaRPr lang="en-CA"/>
           </a:p>
@@ -2557,7 +2557,7 @@
           <a:p>
             <a:fld id="{F04C05AF-8116-461A-AD38-E69AB126D756}" type="datetime1">
               <a:rPr lang="en-CA" smtClean="0"/>
-              <a:t>2026-02-10</a:t>
+              <a:t>2026-02-11</a:t>
             </a:fld>
             <a:endParaRPr lang="en-CA"/>
           </a:p>
@@ -2674,7 +2674,7 @@
           <a:p>
             <a:fld id="{7E6A9D55-1BF1-40D6-87EC-FFE4362AD15D}" type="datetime1">
               <a:rPr lang="en-CA" smtClean="0"/>
-              <a:t>2026-02-10</a:t>
+              <a:t>2026-02-11</a:t>
             </a:fld>
             <a:endParaRPr lang="en-CA"/>
           </a:p>
@@ -2991,7 +2991,7 @@
           <a:p>
             <a:fld id="{CCEA4D12-9B66-4D3F-BFEA-EB6939410680}" type="datetime1">
               <a:rPr lang="en-CA" smtClean="0"/>
-              <a:t>2026-02-10</a:t>
+              <a:t>2026-02-11</a:t>
             </a:fld>
             <a:endParaRPr lang="en-CA"/>
           </a:p>
@@ -3284,7 +3284,7 @@
           <a:p>
             <a:fld id="{590ECAEB-FDAC-4944-A700-E5025FBDCFB8}" type="datetime1">
               <a:rPr lang="en-CA" smtClean="0"/>
-              <a:t>2026-02-10</a:t>
+              <a:t>2026-02-11</a:t>
             </a:fld>
             <a:endParaRPr lang="en-CA"/>
           </a:p>
@@ -3531,7 +3531,7 @@
           <a:p>
             <a:fld id="{8EE9C524-F283-4997-8372-EC621E6F8B97}" type="datetime1">
               <a:rPr lang="en-CA" smtClean="0"/>
-              <a:t>2026-02-10</a:t>
+              <a:t>2026-02-11</a:t>
             </a:fld>
             <a:endParaRPr lang="en-CA"/>
           </a:p>
@@ -4053,7 +4053,7 @@
           <a:p>
             <a:fld id="{A0105903-4A42-43A9-9B07-0A555E8C01D2}" type="datetime1">
               <a:rPr lang="en-CA" smtClean="0"/>
-              <a:t>2026-02-10</a:t>
+              <a:t>2026-02-11</a:t>
             </a:fld>
             <a:endParaRPr lang="en-CA"/>
           </a:p>
@@ -5814,7 +5814,7 @@
           <a:p>
             <a:fld id="{CDC1A3F7-612D-48D0-A380-86227BC8600F}" type="datetime1">
               <a:rPr lang="en-CA" smtClean="0"/>
-              <a:t>2026-02-10</a:t>
+              <a:t>2026-02-11</a:t>
             </a:fld>
             <a:endParaRPr lang="en-CA"/>
           </a:p>
@@ -6456,7 +6456,7 @@
           <a:p>
             <a:fld id="{A165975C-2D17-4D58-BAA2-AE3D2D8697E0}" type="datetime1">
               <a:rPr lang="en-CA" smtClean="0"/>
-              <a:t>2026-02-10</a:t>
+              <a:t>2026-02-11</a:t>
             </a:fld>
             <a:endParaRPr lang="en-CA" dirty="0"/>
           </a:p>
@@ -10639,7 +10639,7 @@
           <a:p>
             <a:fld id="{CDC1A3F7-612D-48D0-A380-86227BC8600F}" type="datetime1">
               <a:rPr lang="en-CA" smtClean="0"/>
-              <a:t>2026-02-10</a:t>
+              <a:t>2026-02-11</a:t>
             </a:fld>
             <a:endParaRPr lang="en-CA"/>
           </a:p>
@@ -11313,7 +11313,7 @@
           <a:p>
             <a:fld id="{CDC1A3F7-612D-48D0-A380-86227BC8600F}" type="datetime1">
               <a:rPr lang="en-CA" smtClean="0"/>
-              <a:t>2026-02-10</a:t>
+              <a:t>2026-02-11</a:t>
             </a:fld>
             <a:endParaRPr lang="en-CA"/>
           </a:p>
@@ -11709,7 +11709,7 @@
             </a:pPr>
             <a:r>
               <a:rPr lang="en-CA" dirty="0"/>
-              <a:t>	f = faults (too be discussed)</a:t>
+              <a:t>	f = faults (to be discussed)</a:t>
             </a:r>
           </a:p>
         </p:txBody>

</xml_diff>